<commit_message>
Added my github account to the powerpoint slides
</commit_message>
<xml_diff>
--- a/NHibernate.pptx
+++ b/NHibernate.pptx
@@ -217,7 +217,7 @@
             <a:fld id="{A30DD600-B8BD-4E88-A24E-8CC7E1C5C4E2}" type="datetimeFigureOut">
               <a:rPr lang="en-US" smtClean="0"/>
               <a:pPr/>
-              <a:t>1/22/2010</a:t>
+              <a:t>8/27/2010</a:t>
             </a:fld>
             <a:endParaRPr lang="en-US" dirty="0"/>
           </a:p>
@@ -621,7 +621,7 @@
             <a:fld id="{42F2DDAD-4FA1-4BFD-8ACC-8928C752DA48}" type="datetimeFigureOut">
               <a:rPr lang="en-US" smtClean="0"/>
               <a:pPr/>
-              <a:t>1/22/2010</a:t>
+              <a:t>8/27/2010</a:t>
             </a:fld>
             <a:endParaRPr lang="en-US" dirty="0"/>
           </a:p>
@@ -1492,7 +1492,7 @@
             <a:fld id="{42F2DDAD-4FA1-4BFD-8ACC-8928C752DA48}" type="datetimeFigureOut">
               <a:rPr lang="en-US" smtClean="0"/>
               <a:pPr/>
-              <a:t>1/22/2010</a:t>
+              <a:t>8/27/2010</a:t>
             </a:fld>
             <a:endParaRPr lang="en-US" dirty="0"/>
           </a:p>
@@ -1669,7 +1669,7 @@
             <a:fld id="{42F2DDAD-4FA1-4BFD-8ACC-8928C752DA48}" type="datetimeFigureOut">
               <a:rPr lang="en-US" smtClean="0"/>
               <a:pPr/>
-              <a:t>1/22/2010</a:t>
+              <a:t>8/27/2010</a:t>
             </a:fld>
             <a:endParaRPr lang="en-US" dirty="0"/>
           </a:p>
@@ -1841,7 +1841,7 @@
             <a:fld id="{42F2DDAD-4FA1-4BFD-8ACC-8928C752DA48}" type="datetimeFigureOut">
               <a:rPr lang="en-US" smtClean="0"/>
               <a:pPr/>
-              <a:t>1/22/2010</a:t>
+              <a:t>8/27/2010</a:t>
             </a:fld>
             <a:endParaRPr lang="en-US" dirty="0"/>
           </a:p>
@@ -2053,7 +2053,7 @@
             <a:fld id="{42F2DDAD-4FA1-4BFD-8ACC-8928C752DA48}" type="datetimeFigureOut">
               <a:rPr lang="en-US" smtClean="0"/>
               <a:pPr/>
-              <a:t>1/22/2010</a:t>
+              <a:t>8/27/2010</a:t>
             </a:fld>
             <a:endParaRPr lang="en-US" dirty="0"/>
           </a:p>
@@ -2869,7 +2869,7 @@
             <a:fld id="{42F2DDAD-4FA1-4BFD-8ACC-8928C752DA48}" type="datetimeFigureOut">
               <a:rPr lang="en-US" smtClean="0"/>
               <a:pPr/>
-              <a:t>1/22/2010</a:t>
+              <a:t>8/27/2010</a:t>
             </a:fld>
             <a:endParaRPr lang="en-US" dirty="0"/>
           </a:p>
@@ -3107,7 +3107,7 @@
             <a:fld id="{42F2DDAD-4FA1-4BFD-8ACC-8928C752DA48}" type="datetimeFigureOut">
               <a:rPr lang="en-US" smtClean="0"/>
               <a:pPr/>
-              <a:t>1/22/2010</a:t>
+              <a:t>8/27/2010</a:t>
             </a:fld>
             <a:endParaRPr lang="en-US" dirty="0"/>
           </a:p>
@@ -3432,7 +3432,7 @@
             <a:fld id="{42F2DDAD-4FA1-4BFD-8ACC-8928C752DA48}" type="datetimeFigureOut">
               <a:rPr lang="en-US" smtClean="0"/>
               <a:pPr/>
-              <a:t>1/22/2010</a:t>
+              <a:t>8/27/2010</a:t>
             </a:fld>
             <a:endParaRPr lang="en-US" dirty="0"/>
           </a:p>
@@ -3524,7 +3524,7 @@
             <a:fld id="{42F2DDAD-4FA1-4BFD-8ACC-8928C752DA48}" type="datetimeFigureOut">
               <a:rPr lang="en-US" smtClean="0"/>
               <a:pPr/>
-              <a:t>1/22/2010</a:t>
+              <a:t>8/27/2010</a:t>
             </a:fld>
             <a:endParaRPr lang="en-US" dirty="0"/>
           </a:p>
@@ -4043,7 +4043,7 @@
             <a:fld id="{42F2DDAD-4FA1-4BFD-8ACC-8928C752DA48}" type="datetimeFigureOut">
               <a:rPr lang="en-US" smtClean="0"/>
               <a:pPr/>
-              <a:t>1/22/2010</a:t>
+              <a:t>8/27/2010</a:t>
             </a:fld>
             <a:endParaRPr lang="en-US" dirty="0"/>
           </a:p>
@@ -4556,7 +4556,7 @@
             <a:fld id="{42F2DDAD-4FA1-4BFD-8ACC-8928C752DA48}" type="datetimeFigureOut">
               <a:rPr lang="en-US" smtClean="0"/>
               <a:pPr/>
-              <a:t>1/22/2010</a:t>
+              <a:t>8/27/2010</a:t>
             </a:fld>
             <a:endParaRPr lang="en-US" dirty="0"/>
           </a:p>
@@ -4803,7 +4803,7 @@
             <a:fld id="{42F2DDAD-4FA1-4BFD-8ACC-8928C752DA48}" type="datetimeFigureOut">
               <a:rPr lang="en-US" smtClean="0"/>
               <a:pPr/>
-              <a:t>1/22/2010</a:t>
+              <a:t>8/27/2010</a:t>
             </a:fld>
             <a:endParaRPr lang="en-US" dirty="0"/>
           </a:p>
@@ -5634,15 +5634,7 @@
           <a:p>
             <a:r>
               <a:rPr lang="en-US" dirty="0" smtClean="0"/>
-              <a:t>Use </a:t>
-            </a:r>
-            <a:r>
-              <a:rPr lang="en-US" dirty="0" smtClean="0"/>
-              <a:t>Get or Load if you have the primary id because NHibernate can optimize the way it retrieves information</a:t>
-            </a:r>
-            <a:r>
-              <a:rPr lang="en-US" dirty="0" smtClean="0"/>
-              <a:t>.</a:t>
+              <a:t>Use Get or Load if you have the primary id because NHibernate can optimize the way it retrieves information.</a:t>
             </a:r>
           </a:p>
           <a:p>
@@ -5774,11 +5766,7 @@
             </a:r>
             <a:r>
               <a:rPr lang="en-US" smtClean="0"/>
-              <a:t>from </a:t>
-            </a:r>
-            <a:r>
-              <a:rPr lang="en-US" smtClean="0"/>
-              <a:t>Employee </a:t>
+              <a:t>from Employee </a:t>
             </a:r>
             <a:r>
               <a:rPr lang="en-US" dirty="0" smtClean="0"/>
@@ -7643,7 +7631,45 @@
               </a:rPr>
               <a:t>www.adamaldrich.com</a:t>
             </a:r>
-            <a:endParaRPr lang="en-US" dirty="0"/>
+            <a:r>
+              <a:rPr lang="en-US" dirty="0"/>
+              <a:t> </a:t>
+            </a:r>
+            <a:r>
+              <a:rPr lang="en-US" dirty="0" smtClean="0"/>
+              <a:t>or you can get the latest changes from my </a:t>
+            </a:r>
+            <a:r>
+              <a:rPr lang="en-US" dirty="0" err="1" smtClean="0"/>
+              <a:t>github</a:t>
+            </a:r>
+            <a:r>
+              <a:rPr lang="en-US" dirty="0" smtClean="0"/>
+              <a:t> </a:t>
+            </a:r>
+            <a:r>
+              <a:rPr lang="en-US" smtClean="0"/>
+              <a:t>account </a:t>
+            </a:r>
+            <a:r>
+              <a:rPr lang="en-US" smtClean="0">
+                <a:hlinkClick r:id="rId3"/>
+              </a:rPr>
+              <a:t>http</a:t>
+            </a:r>
+            <a:r>
+              <a:rPr lang="en-US" smtClean="0">
+                <a:hlinkClick r:id="rId3"/>
+              </a:rPr>
+              <a:t>://</a:t>
+            </a:r>
+            <a:r>
+              <a:rPr lang="en-US" smtClean="0">
+                <a:hlinkClick r:id="rId3"/>
+              </a:rPr>
+              <a:t>github.com/aaldrich/Intro-to-NHibernate</a:t>
+            </a:r>
+            <a:endParaRPr lang="en-US" smtClean="0"/>
           </a:p>
         </p:txBody>
       </p:sp>
@@ -8605,11 +8631,7 @@
           <a:p>
             <a:r>
               <a:rPr lang="en-US" dirty="0" smtClean="0"/>
-              <a:t>Each </a:t>
-            </a:r>
-            <a:r>
-              <a:rPr lang="en-US" dirty="0" smtClean="0"/>
-              <a:t>Entity class must have an associated .hbm file.</a:t>
+              <a:t>Each Entity class must have an associated .hbm file.</a:t>
             </a:r>
           </a:p>
           <a:p>

</xml_diff>